<commit_message>
🌱 Add files for 20230927
</commit_message>
<xml_diff>
--- a/class/ARM class/Projects/simple_fan/STM32 보드를 사용한 간단한 선풍기 - 최명수.pptx
+++ b/class/ARM class/Projects/simple_fan/STM32 보드를 사용한 간단한 선풍기 - 최명수.pptx
@@ -8,7 +8,9 @@
     <p:sldId id="256" r:id="rId2"/>
     <p:sldId id="257" r:id="rId3"/>
     <p:sldId id="258" r:id="rId4"/>
-    <p:sldId id="259" r:id="rId5"/>
+    <p:sldId id="260" r:id="rId5"/>
+    <p:sldId id="261" r:id="rId6"/>
+    <p:sldId id="259" r:id="rId7"/>
   </p:sldIdLst>
   <p:sldSz cx="12192000" cy="6858000"/>
   <p:notesSz cx="6858000" cy="9144000"/>
@@ -107,6 +109,11 @@
       </a:defRPr>
     </a:lvl9pPr>
   </p:defaultTextStyle>
+  <p:extLst>
+    <p:ext uri="{EFAFB233-063F-42B5-8137-9DF3F51BA10A}">
+      <p15:sldGuideLst xmlns:p15="http://schemas.microsoft.com/office/powerpoint/2012/main"/>
+    </p:ext>
+  </p:extLst>
 </p:presentation>
 </file>
 
@@ -241,7 +248,7 @@
           <a:p>
             <a:fld id="{878DE1B6-45B0-437E-9158-381EB971DAC0}" type="datetimeFigureOut">
               <a:rPr lang="ko-KR" altLang="en-US" smtClean="0"/>
-              <a:t>2023-09-26</a:t>
+              <a:t>2023-09-27</a:t>
             </a:fld>
             <a:endParaRPr lang="ko-KR" altLang="en-US"/>
           </a:p>
@@ -411,7 +418,7 @@
           <a:p>
             <a:fld id="{878DE1B6-45B0-437E-9158-381EB971DAC0}" type="datetimeFigureOut">
               <a:rPr lang="ko-KR" altLang="en-US" smtClean="0"/>
-              <a:t>2023-09-26</a:t>
+              <a:t>2023-09-27</a:t>
             </a:fld>
             <a:endParaRPr lang="ko-KR" altLang="en-US"/>
           </a:p>
@@ -591,7 +598,7 @@
           <a:p>
             <a:fld id="{878DE1B6-45B0-437E-9158-381EB971DAC0}" type="datetimeFigureOut">
               <a:rPr lang="ko-KR" altLang="en-US" smtClean="0"/>
-              <a:t>2023-09-26</a:t>
+              <a:t>2023-09-27</a:t>
             </a:fld>
             <a:endParaRPr lang="ko-KR" altLang="en-US"/>
           </a:p>
@@ -761,7 +768,7 @@
           <a:p>
             <a:fld id="{878DE1B6-45B0-437E-9158-381EB971DAC0}" type="datetimeFigureOut">
               <a:rPr lang="ko-KR" altLang="en-US" smtClean="0"/>
-              <a:t>2023-09-26</a:t>
+              <a:t>2023-09-27</a:t>
             </a:fld>
             <a:endParaRPr lang="ko-KR" altLang="en-US"/>
           </a:p>
@@ -1007,7 +1014,7 @@
           <a:p>
             <a:fld id="{878DE1B6-45B0-437E-9158-381EB971DAC0}" type="datetimeFigureOut">
               <a:rPr lang="ko-KR" altLang="en-US" smtClean="0"/>
-              <a:t>2023-09-26</a:t>
+              <a:t>2023-09-27</a:t>
             </a:fld>
             <a:endParaRPr lang="ko-KR" altLang="en-US"/>
           </a:p>
@@ -1239,7 +1246,7 @@
           <a:p>
             <a:fld id="{878DE1B6-45B0-437E-9158-381EB971DAC0}" type="datetimeFigureOut">
               <a:rPr lang="ko-KR" altLang="en-US" smtClean="0"/>
-              <a:t>2023-09-26</a:t>
+              <a:t>2023-09-27</a:t>
             </a:fld>
             <a:endParaRPr lang="ko-KR" altLang="en-US"/>
           </a:p>
@@ -1606,7 +1613,7 @@
           <a:p>
             <a:fld id="{878DE1B6-45B0-437E-9158-381EB971DAC0}" type="datetimeFigureOut">
               <a:rPr lang="ko-KR" altLang="en-US" smtClean="0"/>
-              <a:t>2023-09-26</a:t>
+              <a:t>2023-09-27</a:t>
             </a:fld>
             <a:endParaRPr lang="ko-KR" altLang="en-US"/>
           </a:p>
@@ -1724,7 +1731,7 @@
           <a:p>
             <a:fld id="{878DE1B6-45B0-437E-9158-381EB971DAC0}" type="datetimeFigureOut">
               <a:rPr lang="ko-KR" altLang="en-US" smtClean="0"/>
-              <a:t>2023-09-26</a:t>
+              <a:t>2023-09-27</a:t>
             </a:fld>
             <a:endParaRPr lang="ko-KR" altLang="en-US"/>
           </a:p>
@@ -1819,7 +1826,7 @@
           <a:p>
             <a:fld id="{878DE1B6-45B0-437E-9158-381EB971DAC0}" type="datetimeFigureOut">
               <a:rPr lang="ko-KR" altLang="en-US" smtClean="0"/>
-              <a:t>2023-09-26</a:t>
+              <a:t>2023-09-27</a:t>
             </a:fld>
             <a:endParaRPr lang="ko-KR" altLang="en-US"/>
           </a:p>
@@ -2096,7 +2103,7 @@
           <a:p>
             <a:fld id="{878DE1B6-45B0-437E-9158-381EB971DAC0}" type="datetimeFigureOut">
               <a:rPr lang="ko-KR" altLang="en-US" smtClean="0"/>
-              <a:t>2023-09-26</a:t>
+              <a:t>2023-09-27</a:t>
             </a:fld>
             <a:endParaRPr lang="ko-KR" altLang="en-US"/>
           </a:p>
@@ -2349,7 +2356,7 @@
           <a:p>
             <a:fld id="{878DE1B6-45B0-437E-9158-381EB971DAC0}" type="datetimeFigureOut">
               <a:rPr lang="ko-KR" altLang="en-US" smtClean="0"/>
-              <a:t>2023-09-26</a:t>
+              <a:t>2023-09-27</a:t>
             </a:fld>
             <a:endParaRPr lang="ko-KR" altLang="en-US"/>
           </a:p>
@@ -2567,7 +2574,7 @@
           <a:p>
             <a:fld id="{878DE1B6-45B0-437E-9158-381EB971DAC0}" type="datetimeFigureOut">
               <a:rPr lang="ko-KR" altLang="en-US" smtClean="0"/>
-              <a:t>2023-09-26</a:t>
+              <a:t>2023-09-27</a:t>
             </a:fld>
             <a:endParaRPr lang="ko-KR" altLang="en-US"/>
           </a:p>
@@ -3090,7 +3097,12 @@
             <p:ph type="title"/>
           </p:nvPr>
         </p:nvSpPr>
-        <p:spPr/>
+        <p:spPr>
+          <a:xfrm>
+            <a:off x="511029" y="147011"/>
+            <a:ext cx="10515600" cy="1325563"/>
+          </a:xfrm>
+        </p:spPr>
         <p:txBody>
           <a:bodyPr/>
           <a:lstStyle/>
@@ -3115,7 +3127,7 @@
         </p:nvSpPr>
         <p:spPr>
           <a:xfrm>
-            <a:off x="838200" y="1917904"/>
+            <a:off x="511029" y="1716568"/>
             <a:ext cx="10515600" cy="4351338"/>
           </a:xfrm>
         </p:spPr>
@@ -3125,15 +3137,42 @@
           <a:p>
             <a:r>
               <a:rPr lang="ko-KR" altLang="en-US" dirty="0" smtClean="0"/>
-              <a:t>선풍기 강약 조절에 쓰일</a:t>
-            </a:r>
+              <a:t>선풍기 </a:t>
+            </a:r>
+            <a:r>
+              <a:rPr lang="ko-KR" altLang="en-US" dirty="0" smtClean="0"/>
+              <a:t>세기</a:t>
+            </a:r>
+            <a:r>
+              <a:rPr lang="ko-KR" altLang="en-US" dirty="0" smtClean="0"/>
+              <a:t> 조절</a:t>
+            </a:r>
+            <a:endParaRPr lang="en-US" altLang="ko-KR" dirty="0"/>
+          </a:p>
+          <a:p>
+            <a:pPr lvl="1">
+              <a:buFontTx/>
+              <a:buChar char="-"/>
+            </a:pPr>
             <a:r>
               <a:rPr lang="en-US" altLang="ko-KR" dirty="0" smtClean="0"/>
-              <a:t> STM32 timer</a:t>
+              <a:t>STM32 </a:t>
             </a:r>
             <a:r>
               <a:rPr lang="ko-KR" altLang="en-US" dirty="0" smtClean="0"/>
-              <a:t>의 </a:t>
+              <a:t>보드의 </a:t>
+            </a:r>
+            <a:r>
+              <a:rPr lang="en-US" altLang="ko-KR" dirty="0" smtClean="0"/>
+              <a:t>timer</a:t>
+            </a:r>
+            <a:r>
+              <a:rPr lang="ko-KR" altLang="en-US" dirty="0" smtClean="0"/>
+              <a:t>를 사용한</a:t>
+            </a:r>
+            <a:r>
+              <a:rPr lang="ko-KR" altLang="en-US" dirty="0" smtClean="0"/>
+              <a:t> </a:t>
             </a:r>
             <a:r>
               <a:rPr lang="en-US" altLang="ko-KR" dirty="0" smtClean="0"/>
@@ -3141,14 +3180,53 @@
             </a:r>
             <a:r>
               <a:rPr lang="ko-KR" altLang="en-US" dirty="0" smtClean="0"/>
-              <a:t>제어</a:t>
+              <a:t>생성</a:t>
+            </a:r>
+            <a:endParaRPr lang="en-US" altLang="ko-KR" dirty="0"/>
+          </a:p>
+          <a:p>
+            <a:pPr lvl="1">
+              <a:buFontTx/>
+              <a:buChar char="-"/>
+            </a:pPr>
+            <a:r>
+              <a:rPr lang="ko-KR" altLang="en-US" dirty="0" smtClean="0"/>
+              <a:t>버튼 상태 읽기</a:t>
+            </a:r>
+            <a:endParaRPr lang="en-US" altLang="ko-KR" dirty="0"/>
+          </a:p>
+          <a:p>
+            <a:pPr marL="457200" lvl="1" indent="0">
+              <a:buNone/>
+            </a:pPr>
+            <a:r>
+              <a:rPr lang="en-US" altLang="ko-KR" dirty="0" smtClean="0"/>
+              <a:t> </a:t>
             </a:r>
             <a:endParaRPr lang="en-US" altLang="ko-KR" dirty="0" smtClean="0"/>
           </a:p>
           <a:p>
             <a:r>
               <a:rPr lang="ko-KR" altLang="en-US" dirty="0" smtClean="0"/>
-              <a:t>선풍기 상태 표시를 위한 </a:t>
+              <a:t>선풍기 상태 </a:t>
+            </a:r>
+            <a:r>
+              <a:rPr lang="ko-KR" altLang="en-US" dirty="0" smtClean="0"/>
+              <a:t>표시</a:t>
+            </a:r>
+            <a:endParaRPr lang="en-US" altLang="ko-KR" dirty="0"/>
+          </a:p>
+          <a:p>
+            <a:pPr marL="457200" lvl="1" indent="0">
+              <a:buNone/>
+            </a:pPr>
+            <a:r>
+              <a:rPr lang="en-US" altLang="ko-KR" dirty="0" smtClean="0"/>
+              <a:t>-</a:t>
+            </a:r>
+            <a:r>
+              <a:rPr lang="ko-KR" altLang="en-US" dirty="0" smtClean="0"/>
+              <a:t> </a:t>
             </a:r>
             <a:r>
               <a:rPr lang="en-US" altLang="ko-KR" dirty="0" smtClean="0"/>
@@ -3199,34 +3277,6 @@
           <a:chExt cx="0" cy="0"/>
         </a:xfrm>
       </p:grpSpPr>
-      <p:sp>
-        <p:nvSpPr>
-          <p:cNvPr id="2" name="제목 1"/>
-          <p:cNvSpPr>
-            <a:spLocks noGrp="1"/>
-          </p:cNvSpPr>
-          <p:nvPr>
-            <p:ph type="title"/>
-          </p:nvPr>
-        </p:nvSpPr>
-        <p:spPr>
-          <a:xfrm>
-            <a:off x="838199" y="243827"/>
-            <a:ext cx="10515600" cy="1325563"/>
-          </a:xfrm>
-        </p:spPr>
-        <p:txBody>
-          <a:bodyPr/>
-          <a:lstStyle/>
-          <a:p>
-            <a:r>
-              <a:rPr lang="en-US" altLang="ko-KR" dirty="0" smtClean="0"/>
-              <a:t>State Machine Diagram</a:t>
-            </a:r>
-            <a:endParaRPr lang="ko-KR" altLang="en-US" dirty="0"/>
-          </a:p>
-        </p:txBody>
-      </p:sp>
       <p:grpSp>
         <p:nvGrpSpPr>
           <p:cNvPr id="141" name="그룹 140"/>
@@ -3687,7 +3737,6 @@
                   <a:rPr lang="en-US" altLang="ko-KR" sz="1200" dirty="0" smtClean="0"/>
                   <a:t>LED 2 lights up</a:t>
                 </a:r>
-                <a:endParaRPr lang="en-US" altLang="ko-KR" sz="1200" dirty="0" smtClean="0"/>
               </a:p>
               <a:p>
                 <a:r>
@@ -3884,7 +3933,6 @@
                   <a:rPr lang="en-US" altLang="ko-KR" sz="1200" dirty="0" smtClean="0"/>
                   <a:t>LED 3 lights up</a:t>
                 </a:r>
-                <a:endParaRPr lang="en-US" altLang="ko-KR" sz="1200" dirty="0" smtClean="0"/>
               </a:p>
               <a:p>
                 <a:r>
@@ -4990,6 +5038,55 @@
           </p:sp>
         </p:grpSp>
       </p:grpSp>
+      <p:sp>
+        <p:nvSpPr>
+          <p:cNvPr id="59" name="제목 1"/>
+          <p:cNvSpPr txBox="1">
+            <a:spLocks/>
+          </p:cNvSpPr>
+          <p:nvPr/>
+        </p:nvSpPr>
+        <p:spPr>
+          <a:xfrm>
+            <a:off x="511029" y="147011"/>
+            <a:ext cx="10515600" cy="1325563"/>
+          </a:xfrm>
+          <a:prstGeom prst="rect">
+            <a:avLst/>
+          </a:prstGeom>
+        </p:spPr>
+        <p:txBody>
+          <a:bodyPr vert="horz" lIns="91440" tIns="45720" rIns="91440" bIns="45720" rtlCol="0" anchor="ctr">
+            <a:normAutofit/>
+          </a:bodyPr>
+          <a:lstStyle>
+            <a:lvl1pPr algn="l" defTabSz="914400" rtl="0" eaLnBrk="1" latinLnBrk="1" hangingPunct="1">
+              <a:lnSpc>
+                <a:spcPct val="90000"/>
+              </a:lnSpc>
+              <a:spcBef>
+                <a:spcPct val="0"/>
+              </a:spcBef>
+              <a:buNone/>
+              <a:defRPr sz="4400" kern="1200">
+                <a:solidFill>
+                  <a:schemeClr val="tx1"/>
+                </a:solidFill>
+                <a:latin typeface="+mj-lt"/>
+                <a:ea typeface="+mj-ea"/>
+                <a:cs typeface="+mj-cs"/>
+              </a:defRPr>
+            </a:lvl1pPr>
+          </a:lstStyle>
+          <a:p>
+            <a:r>
+              <a:rPr lang="en-US" altLang="ko-KR" dirty="0" smtClean="0"/>
+              <a:t>State Machine Diagram</a:t>
+            </a:r>
+            <a:endParaRPr lang="ko-KR" altLang="en-US" dirty="0"/>
+          </a:p>
+        </p:txBody>
+      </p:sp>
     </p:spTree>
     <p:extLst>
       <p:ext uri="{BB962C8B-B14F-4D97-AF65-F5344CB8AC3E}">
@@ -5011,6 +5108,363 @@
 </file>
 
 <file path=ppt/slides/slide4.xml><?xml version="1.0" encoding="utf-8"?>
+<p:sld xmlns:a="http://schemas.openxmlformats.org/drawingml/2006/main" xmlns:r="http://schemas.openxmlformats.org/officeDocument/2006/relationships" xmlns:p="http://schemas.openxmlformats.org/presentationml/2006/main">
+  <p:cSld>
+    <p:spTree>
+      <p:nvGrpSpPr>
+        <p:cNvPr id="1" name=""/>
+        <p:cNvGrpSpPr/>
+        <p:nvPr/>
+      </p:nvGrpSpPr>
+      <p:grpSpPr>
+        <a:xfrm>
+          <a:off x="0" y="0"/>
+          <a:ext cx="0" cy="0"/>
+          <a:chOff x="0" y="0"/>
+          <a:chExt cx="0" cy="0"/>
+        </a:xfrm>
+      </p:grpSpPr>
+      <p:pic>
+        <p:nvPicPr>
+          <p:cNvPr id="5" name="그림 4"/>
+          <p:cNvPicPr>
+            <a:picLocks noChangeAspect="1"/>
+          </p:cNvPicPr>
+          <p:nvPr/>
+        </p:nvPicPr>
+        <p:blipFill>
+          <a:blip r:embed="rId2">
+            <a:extLst>
+              <a:ext uri="{28A0092B-C50C-407E-A947-70E740481C1C}">
+                <a14:useLocalDpi xmlns:a14="http://schemas.microsoft.com/office/drawing/2010/main" val="0"/>
+              </a:ext>
+            </a:extLst>
+          </a:blip>
+          <a:stretch>
+            <a:fillRect/>
+          </a:stretch>
+        </p:blipFill>
+        <p:spPr>
+          <a:xfrm>
+            <a:off x="326471" y="1568160"/>
+            <a:ext cx="3305963" cy="4938960"/>
+          </a:xfrm>
+          <a:prstGeom prst="rect">
+            <a:avLst/>
+          </a:prstGeom>
+        </p:spPr>
+      </p:pic>
+      <p:pic>
+        <p:nvPicPr>
+          <p:cNvPr id="6" name="그림 5"/>
+          <p:cNvPicPr>
+            <a:picLocks noChangeAspect="1"/>
+          </p:cNvPicPr>
+          <p:nvPr/>
+        </p:nvPicPr>
+        <p:blipFill>
+          <a:blip r:embed="rId3" cstate="print">
+            <a:extLst>
+              <a:ext uri="{28A0092B-C50C-407E-A947-70E740481C1C}">
+                <a14:useLocalDpi xmlns:a14="http://schemas.microsoft.com/office/drawing/2010/main" val="0"/>
+              </a:ext>
+            </a:extLst>
+          </a:blip>
+          <a:stretch>
+            <a:fillRect/>
+          </a:stretch>
+        </p:blipFill>
+        <p:spPr>
+          <a:xfrm>
+            <a:off x="3816523" y="3696228"/>
+            <a:ext cx="3414787" cy="2812408"/>
+          </a:xfrm>
+          <a:prstGeom prst="rect">
+            <a:avLst/>
+          </a:prstGeom>
+        </p:spPr>
+      </p:pic>
+      <p:pic>
+        <p:nvPicPr>
+          <p:cNvPr id="7" name="그림 6"/>
+          <p:cNvPicPr>
+            <a:picLocks noChangeAspect="1"/>
+          </p:cNvPicPr>
+          <p:nvPr/>
+        </p:nvPicPr>
+        <p:blipFill>
+          <a:blip r:embed="rId4" cstate="print">
+            <a:extLst>
+              <a:ext uri="{28A0092B-C50C-407E-A947-70E740481C1C}">
+                <a14:useLocalDpi xmlns:a14="http://schemas.microsoft.com/office/drawing/2010/main" val="0"/>
+              </a:ext>
+            </a:extLst>
+          </a:blip>
+          <a:stretch>
+            <a:fillRect/>
+          </a:stretch>
+        </p:blipFill>
+        <p:spPr>
+          <a:xfrm>
+            <a:off x="3816523" y="1568160"/>
+            <a:ext cx="3414787" cy="1969010"/>
+          </a:xfrm>
+          <a:prstGeom prst="rect">
+            <a:avLst/>
+          </a:prstGeom>
+        </p:spPr>
+      </p:pic>
+      <p:pic>
+        <p:nvPicPr>
+          <p:cNvPr id="8" name="그림 7"/>
+          <p:cNvPicPr>
+            <a:picLocks noChangeAspect="1"/>
+          </p:cNvPicPr>
+          <p:nvPr/>
+        </p:nvPicPr>
+        <p:blipFill>
+          <a:blip r:embed="rId5" cstate="print">
+            <a:extLst>
+              <a:ext uri="{28A0092B-C50C-407E-A947-70E740481C1C}">
+                <a14:useLocalDpi xmlns:a14="http://schemas.microsoft.com/office/drawing/2010/main" val="0"/>
+              </a:ext>
+            </a:extLst>
+          </a:blip>
+          <a:stretch>
+            <a:fillRect/>
+          </a:stretch>
+        </p:blipFill>
+        <p:spPr>
+          <a:xfrm>
+            <a:off x="7415398" y="1568160"/>
+            <a:ext cx="4475623" cy="1969010"/>
+          </a:xfrm>
+          <a:prstGeom prst="rect">
+            <a:avLst/>
+          </a:prstGeom>
+        </p:spPr>
+      </p:pic>
+      <p:pic>
+        <p:nvPicPr>
+          <p:cNvPr id="9" name="그림 8"/>
+          <p:cNvPicPr>
+            <a:picLocks noChangeAspect="1"/>
+          </p:cNvPicPr>
+          <p:nvPr/>
+        </p:nvPicPr>
+        <p:blipFill>
+          <a:blip r:embed="rId6" cstate="print">
+            <a:extLst>
+              <a:ext uri="{28A0092B-C50C-407E-A947-70E740481C1C}">
+                <a14:useLocalDpi xmlns:a14="http://schemas.microsoft.com/office/drawing/2010/main" val="0"/>
+              </a:ext>
+            </a:extLst>
+          </a:blip>
+          <a:stretch>
+            <a:fillRect/>
+          </a:stretch>
+        </p:blipFill>
+        <p:spPr>
+          <a:xfrm>
+            <a:off x="7415398" y="3696228"/>
+            <a:ext cx="1225261" cy="2807244"/>
+          </a:xfrm>
+          <a:prstGeom prst="rect">
+            <a:avLst/>
+          </a:prstGeom>
+        </p:spPr>
+      </p:pic>
+      <p:sp>
+        <p:nvSpPr>
+          <p:cNvPr id="12" name="제목 1"/>
+          <p:cNvSpPr txBox="1">
+            <a:spLocks/>
+          </p:cNvSpPr>
+          <p:nvPr/>
+        </p:nvSpPr>
+        <p:spPr>
+          <a:xfrm>
+            <a:off x="511029" y="147011"/>
+            <a:ext cx="10515600" cy="1325563"/>
+          </a:xfrm>
+          <a:prstGeom prst="rect">
+            <a:avLst/>
+          </a:prstGeom>
+        </p:spPr>
+        <p:txBody>
+          <a:bodyPr vert="horz" lIns="91440" tIns="45720" rIns="91440" bIns="45720" rtlCol="0" anchor="ctr">
+            <a:normAutofit/>
+          </a:bodyPr>
+          <a:lstStyle>
+            <a:lvl1pPr algn="l" defTabSz="914400" rtl="0" eaLnBrk="1" latinLnBrk="1" hangingPunct="1">
+              <a:lnSpc>
+                <a:spcPct val="90000"/>
+              </a:lnSpc>
+              <a:spcBef>
+                <a:spcPct val="0"/>
+              </a:spcBef>
+              <a:buNone/>
+              <a:defRPr sz="4400" kern="1200">
+                <a:solidFill>
+                  <a:schemeClr val="tx1"/>
+                </a:solidFill>
+                <a:latin typeface="+mj-lt"/>
+                <a:ea typeface="+mj-ea"/>
+                <a:cs typeface="+mj-cs"/>
+              </a:defRPr>
+            </a:lvl1pPr>
+          </a:lstStyle>
+          <a:p>
+            <a:r>
+              <a:rPr lang="ko-KR" altLang="en-US" dirty="0" smtClean="0"/>
+              <a:t>회로도</a:t>
+            </a:r>
+            <a:endParaRPr lang="ko-KR" altLang="en-US" dirty="0"/>
+          </a:p>
+        </p:txBody>
+      </p:sp>
+    </p:spTree>
+    <p:extLst>
+      <p:ext uri="{BB962C8B-B14F-4D97-AF65-F5344CB8AC3E}">
+        <p14:creationId xmlns:p14="http://schemas.microsoft.com/office/powerpoint/2010/main" val="3123041001"/>
+      </p:ext>
+    </p:extLst>
+  </p:cSld>
+  <p:clrMapOvr>
+    <a:masterClrMapping/>
+  </p:clrMapOvr>
+  <p:timing>
+    <p:tnLst>
+      <p:par>
+        <p:cTn id="1" dur="indefinite" restart="never" nodeType="tmRoot"/>
+      </p:par>
+    </p:tnLst>
+  </p:timing>
+</p:sld>
+</file>
+
+<file path=ppt/slides/slide5.xml><?xml version="1.0" encoding="utf-8"?>
+<p:sld xmlns:a="http://schemas.openxmlformats.org/drawingml/2006/main" xmlns:r="http://schemas.openxmlformats.org/officeDocument/2006/relationships" xmlns:p="http://schemas.openxmlformats.org/presentationml/2006/main">
+  <p:cSld>
+    <p:spTree>
+      <p:nvGrpSpPr>
+        <p:cNvPr id="1" name=""/>
+        <p:cNvGrpSpPr/>
+        <p:nvPr/>
+      </p:nvGrpSpPr>
+      <p:grpSpPr>
+        <a:xfrm>
+          <a:off x="0" y="0"/>
+          <a:ext cx="0" cy="0"/>
+          <a:chOff x="0" y="0"/>
+          <a:chExt cx="0" cy="0"/>
+        </a:xfrm>
+      </p:grpSpPr>
+      <p:sp>
+        <p:nvSpPr>
+          <p:cNvPr id="4" name="제목 1"/>
+          <p:cNvSpPr txBox="1">
+            <a:spLocks/>
+          </p:cNvSpPr>
+          <p:nvPr/>
+        </p:nvSpPr>
+        <p:spPr>
+          <a:xfrm>
+            <a:off x="511029" y="147011"/>
+            <a:ext cx="10515600" cy="1325563"/>
+          </a:xfrm>
+          <a:prstGeom prst="rect">
+            <a:avLst/>
+          </a:prstGeom>
+        </p:spPr>
+        <p:txBody>
+          <a:bodyPr vert="horz" lIns="91440" tIns="45720" rIns="91440" bIns="45720" rtlCol="0" anchor="ctr">
+            <a:normAutofit/>
+          </a:bodyPr>
+          <a:lstStyle>
+            <a:lvl1pPr algn="l" defTabSz="914400" rtl="0" eaLnBrk="1" latinLnBrk="1" hangingPunct="1">
+              <a:lnSpc>
+                <a:spcPct val="90000"/>
+              </a:lnSpc>
+              <a:spcBef>
+                <a:spcPct val="0"/>
+              </a:spcBef>
+              <a:buNone/>
+              <a:defRPr sz="4400" kern="1200">
+                <a:solidFill>
+                  <a:schemeClr val="tx1"/>
+                </a:solidFill>
+                <a:latin typeface="+mj-lt"/>
+                <a:ea typeface="+mj-ea"/>
+                <a:cs typeface="+mj-cs"/>
+              </a:defRPr>
+            </a:lvl1pPr>
+          </a:lstStyle>
+          <a:p>
+            <a:r>
+              <a:rPr lang="ko-KR" altLang="en-US" dirty="0" smtClean="0"/>
+              <a:t>회로도 구현</a:t>
+            </a:r>
+            <a:endParaRPr lang="ko-KR" altLang="en-US" dirty="0"/>
+          </a:p>
+        </p:txBody>
+      </p:sp>
+      <p:pic>
+        <p:nvPicPr>
+          <p:cNvPr id="6" name="그림 5"/>
+          <p:cNvPicPr>
+            <a:picLocks noChangeAspect="1"/>
+          </p:cNvPicPr>
+          <p:nvPr/>
+        </p:nvPicPr>
+        <p:blipFill rotWithShape="1">
+          <a:blip r:embed="rId2" cstate="print">
+            <a:extLst>
+              <a:ext uri="{28A0092B-C50C-407E-A947-70E740481C1C}">
+                <a14:useLocalDpi xmlns:a14="http://schemas.microsoft.com/office/drawing/2010/main" val="0"/>
+              </a:ext>
+            </a:extLst>
+          </a:blip>
+          <a:srcRect l="12642" r="22720"/>
+          <a:stretch/>
+        </p:blipFill>
+        <p:spPr>
+          <a:xfrm>
+            <a:off x="2263677" y="1363517"/>
+            <a:ext cx="7010303" cy="5272176"/>
+          </a:xfrm>
+          <a:prstGeom prst="rect">
+            <a:avLst/>
+          </a:prstGeom>
+          <a:ln>
+            <a:noFill/>
+          </a:ln>
+          <a:effectLst>
+            <a:softEdge rad="112500"/>
+          </a:effectLst>
+        </p:spPr>
+      </p:pic>
+    </p:spTree>
+    <p:extLst>
+      <p:ext uri="{BB962C8B-B14F-4D97-AF65-F5344CB8AC3E}">
+        <p14:creationId xmlns:p14="http://schemas.microsoft.com/office/powerpoint/2010/main" val="2264184127"/>
+      </p:ext>
+    </p:extLst>
+  </p:cSld>
+  <p:clrMapOvr>
+    <a:masterClrMapping/>
+  </p:clrMapOvr>
+  <p:timing>
+    <p:tnLst>
+      <p:par>
+        <p:cTn id="1" dur="indefinite" restart="never" nodeType="tmRoot"/>
+      </p:par>
+    </p:tnLst>
+  </p:timing>
+</p:sld>
+</file>
+
+<file path=ppt/slides/slide6.xml><?xml version="1.0" encoding="utf-8"?>
 <p:sld xmlns:a="http://schemas.openxmlformats.org/drawingml/2006/main" xmlns:r="http://schemas.openxmlformats.org/officeDocument/2006/relationships" xmlns:p="http://schemas.openxmlformats.org/presentationml/2006/main">
   <p:cSld>
     <p:spTree>

</xml_diff>